<commit_message>
11 27 ri 001
</commit_message>
<xml_diff>
--- a/2、正式课/1、第一周/5、第五天/原型图.pptx
+++ b/2、正式课/1、第一周/5、第五天/原型图.pptx
@@ -289,7 +289,7 @@
             <a:fld id="{530820CF-B880-4189-942D-D702A7CBA730}" type="datetimeFigureOut">
               <a:rPr lang="zh-CN" altLang="en-US" smtClean="0"/>
               <a:pPr/>
-              <a:t>2019/11/23</a:t>
+              <a:t>2019/11/25</a:t>
             </a:fld>
             <a:endParaRPr lang="zh-CN" altLang="en-US"/>
           </a:p>
@@ -456,7 +456,7 @@
             <a:fld id="{530820CF-B880-4189-942D-D702A7CBA730}" type="datetimeFigureOut">
               <a:rPr lang="zh-CN" altLang="en-US" smtClean="0"/>
               <a:pPr/>
-              <a:t>2019/11/23</a:t>
+              <a:t>2019/11/25</a:t>
             </a:fld>
             <a:endParaRPr lang="zh-CN" altLang="en-US"/>
           </a:p>
@@ -633,7 +633,7 @@
             <a:fld id="{530820CF-B880-4189-942D-D702A7CBA730}" type="datetimeFigureOut">
               <a:rPr lang="zh-CN" altLang="en-US" smtClean="0"/>
               <a:pPr/>
-              <a:t>2019/11/23</a:t>
+              <a:t>2019/11/25</a:t>
             </a:fld>
             <a:endParaRPr lang="zh-CN" altLang="en-US"/>
           </a:p>
@@ -800,7 +800,7 @@
             <a:fld id="{530820CF-B880-4189-942D-D702A7CBA730}" type="datetimeFigureOut">
               <a:rPr lang="zh-CN" altLang="en-US" smtClean="0"/>
               <a:pPr/>
-              <a:t>2019/11/23</a:t>
+              <a:t>2019/11/25</a:t>
             </a:fld>
             <a:endParaRPr lang="zh-CN" altLang="en-US"/>
           </a:p>
@@ -1043,7 +1043,7 @@
             <a:fld id="{530820CF-B880-4189-942D-D702A7CBA730}" type="datetimeFigureOut">
               <a:rPr lang="zh-CN" altLang="en-US" smtClean="0"/>
               <a:pPr/>
-              <a:t>2019/11/23</a:t>
+              <a:t>2019/11/25</a:t>
             </a:fld>
             <a:endParaRPr lang="zh-CN" altLang="en-US"/>
           </a:p>
@@ -1328,7 +1328,7 @@
             <a:fld id="{530820CF-B880-4189-942D-D702A7CBA730}" type="datetimeFigureOut">
               <a:rPr lang="zh-CN" altLang="en-US" smtClean="0"/>
               <a:pPr/>
-              <a:t>2019/11/23</a:t>
+              <a:t>2019/11/25</a:t>
             </a:fld>
             <a:endParaRPr lang="zh-CN" altLang="en-US"/>
           </a:p>
@@ -1747,7 +1747,7 @@
             <a:fld id="{530820CF-B880-4189-942D-D702A7CBA730}" type="datetimeFigureOut">
               <a:rPr lang="zh-CN" altLang="en-US" smtClean="0"/>
               <a:pPr/>
-              <a:t>2019/11/23</a:t>
+              <a:t>2019/11/25</a:t>
             </a:fld>
             <a:endParaRPr lang="zh-CN" altLang="en-US"/>
           </a:p>
@@ -1862,7 +1862,7 @@
             <a:fld id="{530820CF-B880-4189-942D-D702A7CBA730}" type="datetimeFigureOut">
               <a:rPr lang="zh-CN" altLang="en-US" smtClean="0"/>
               <a:pPr/>
-              <a:t>2019/11/23</a:t>
+              <a:t>2019/11/25</a:t>
             </a:fld>
             <a:endParaRPr lang="zh-CN" altLang="en-US"/>
           </a:p>
@@ -1954,7 +1954,7 @@
             <a:fld id="{530820CF-B880-4189-942D-D702A7CBA730}" type="datetimeFigureOut">
               <a:rPr lang="zh-CN" altLang="en-US" smtClean="0"/>
               <a:pPr/>
-              <a:t>2019/11/23</a:t>
+              <a:t>2019/11/25</a:t>
             </a:fld>
             <a:endParaRPr lang="zh-CN" altLang="en-US"/>
           </a:p>
@@ -2228,7 +2228,7 @@
             <a:fld id="{530820CF-B880-4189-942D-D702A7CBA730}" type="datetimeFigureOut">
               <a:rPr lang="zh-CN" altLang="en-US" smtClean="0"/>
               <a:pPr/>
-              <a:t>2019/11/23</a:t>
+              <a:t>2019/11/25</a:t>
             </a:fld>
             <a:endParaRPr lang="zh-CN" altLang="en-US"/>
           </a:p>
@@ -2478,7 +2478,7 @@
             <a:fld id="{530820CF-B880-4189-942D-D702A7CBA730}" type="datetimeFigureOut">
               <a:rPr lang="zh-CN" altLang="en-US" smtClean="0"/>
               <a:pPr/>
-              <a:t>2019/11/23</a:t>
+              <a:t>2019/11/25</a:t>
             </a:fld>
             <a:endParaRPr lang="zh-CN" altLang="en-US"/>
           </a:p>
@@ -2688,7 +2688,7 @@
             <a:fld id="{530820CF-B880-4189-942D-D702A7CBA730}" type="datetimeFigureOut">
               <a:rPr lang="zh-CN" altLang="en-US" smtClean="0"/>
               <a:pPr/>
-              <a:t>2019/11/23</a:t>
+              <a:t>2019/11/25</a:t>
             </a:fld>
             <a:endParaRPr lang="zh-CN" altLang="en-US"/>
           </a:p>
@@ -5828,6 +5828,57 @@
                 <a:srgbClr val="FF0000"/>
               </a:solidFill>
             </a:endParaRPr>
+          </a:p>
+        </p:txBody>
+      </p:sp>
+      <p:sp>
+        <p:nvSpPr>
+          <p:cNvPr id="73" name="TextBox 72"/>
+          <p:cNvSpPr txBox="1"/>
+          <p:nvPr/>
+        </p:nvSpPr>
+        <p:spPr>
+          <a:xfrm>
+            <a:off x="720230" y="7344891"/>
+            <a:ext cx="5349541" cy="2308324"/>
+          </a:xfrm>
+          <a:prstGeom prst="rect">
+            <a:avLst/>
+          </a:prstGeom>
+          <a:noFill/>
+        </p:spPr>
+        <p:txBody>
+          <a:bodyPr wrap="none" rtlCol="0">
+            <a:spAutoFit/>
+          </a:bodyPr>
+          <a:lstStyle/>
+          <a:p>
+            <a:r>
+              <a:rPr lang="en-US" altLang="zh-CN" sz="4800" dirty="0" smtClean="0"/>
+              <a:t>f</a:t>
+            </a:r>
+            <a:r>
+              <a:rPr lang="en-US" altLang="zh-CN" sz="4800" dirty="0" smtClean="0"/>
+              <a:t>1 instanceof  Fn</a:t>
+            </a:r>
+          </a:p>
+          <a:p>
+            <a:r>
+              <a:rPr lang="en-US" altLang="zh-CN" sz="4800" dirty="0" smtClean="0"/>
+              <a:t>f1 </a:t>
+            </a:r>
+            <a:r>
+              <a:rPr lang="en-US" altLang="zh-CN" sz="4800" smtClean="0"/>
+              <a:t>instanceof  </a:t>
+            </a:r>
+            <a:r>
+              <a:rPr lang="en-US" altLang="zh-CN" sz="4800" smtClean="0"/>
+              <a:t>Object</a:t>
+            </a:r>
+            <a:endParaRPr lang="zh-CN" altLang="en-US" sz="4800" smtClean="0"/>
+          </a:p>
+          <a:p>
+            <a:endParaRPr lang="zh-CN" altLang="en-US" sz="4800" dirty="0"/>
           </a:p>
         </p:txBody>
       </p:sp>

</xml_diff>